<commit_message>
Added Course Materials - Day 11
</commit_message>
<xml_diff>
--- a/2. Core Java/Day 10/Slides/3. Finding Parts of a Page/3-jquery-getting-started-m3-slides.pptx
+++ b/2. Core Java/Day 10/Slides/3. Finding Parts of a Page/3-jquery-getting-started-m3-slides.pptx
@@ -6053,8 +6053,8 @@
         </p:nvSpPr>
         <p:spPr>
           <a:xfrm>
-            <a:off x="3727512" y="1388333"/>
-            <a:ext cx="4737735" cy="5073015"/>
+            <a:off x="1173480" y="1388110"/>
+            <a:ext cx="9540240" cy="1733550"/>
           </a:xfrm>
           <a:prstGeom prst="rect">
             <a:avLst/>
@@ -6082,28 +6082,7 @@
                 <a:latin typeface="Consolas" panose="020B0609020204030204"/>
                 <a:cs typeface="Consolas" panose="020B0609020204030204"/>
               </a:rPr>
-              <a:t>html</a:t>
-            </a:r>
-            <a:endParaRPr sz="2400">
-              <a:latin typeface="Consolas" panose="020B0609020204030204"/>
-              <a:cs typeface="Consolas" panose="020B0609020204030204"/>
-            </a:endParaRPr>
-          </a:p>
-          <a:p>
-            <a:pPr marL="2031365" marR="2026285" algn="ctr">
-              <a:lnSpc>
-                <a:spcPct val="183000"/>
-              </a:lnSpc>
-            </a:pPr>
-            <a:r>
-              <a:rPr sz="2400" dirty="0">
-                <a:solidFill>
-                  <a:srgbClr val="FFFFFF"/>
-                </a:solidFill>
-                <a:latin typeface="Consolas" panose="020B0609020204030204"/>
-                <a:cs typeface="Consolas" panose="020B0609020204030204"/>
-              </a:rPr>
-              <a:t>bo</a:t>
+              <a:t>htmlbo</a:t>
             </a:r>
             <a:r>
               <a:rPr sz="2400" spc="10" dirty="0">

</xml_diff>